<commit_message>
updates to rec, eligiblemodulepredicate not working yet
</commit_message>
<xml_diff>
--- a/docs/diagrams/RecModuleClassDiagram.pptx
+++ b/docs/diagrams/RecModuleClassDiagram.pptx
@@ -109,7 +109,7 @@
   </p:defaultTextStyle>
   <p:extLst>
     <p:ext uri="{EFAFB233-063F-42B5-8137-9DF3F51BA10A}">
-      <p15:sldGuideLst xmlns="" xmlns:p15="http://schemas.microsoft.com/office/powerpoint/2012/main">
+      <p15:sldGuideLst xmlns:p15="http://schemas.microsoft.com/office/powerpoint/2012/main" xmlns="">
         <p15:guide id="1" orient="horz" pos="1488">
           <p15:clr>
             <a:srgbClr val="A4A3A4"/>
@@ -209,7 +209,7 @@
             <a:fld id="{F5CC4B3F-88C1-4FFA-B1B6-F41C21DC6924}" type="datetimeFigureOut">
               <a:rPr lang="en-US" smtClean="0"/>
               <a:pPr/>
-              <a:t>4/10/2019</a:t>
+              <a:t>4/12/2019</a:t>
             </a:fld>
             <a:endParaRPr lang="en-US"/>
           </a:p>
@@ -377,7 +377,7 @@
     </p:spTree>
     <p:extLst>
       <p:ext uri="{BB962C8B-B14F-4D97-AF65-F5344CB8AC3E}">
-        <p14:creationId xmlns="" xmlns:p14="http://schemas.microsoft.com/office/powerpoint/2010/main" val="2023976206"/>
+        <p14:creationId xmlns:p14="http://schemas.microsoft.com/office/powerpoint/2010/main" xmlns="" val="2023976206"/>
       </p:ext>
     </p:extLst>
   </p:cSld>
@@ -657,7 +657,7 @@
             <a:fld id="{78C97017-6FC3-485B-9764-EAC9E56C1D49}" type="datetimeFigureOut">
               <a:rPr lang="en-US" smtClean="0"/>
               <a:pPr/>
-              <a:t>4/10/2019</a:t>
+              <a:t>4/12/2019</a:t>
             </a:fld>
             <a:endParaRPr lang="en-US"/>
           </a:p>
@@ -709,7 +709,7 @@
     </p:spTree>
     <p:extLst>
       <p:ext uri="{BB962C8B-B14F-4D97-AF65-F5344CB8AC3E}">
-        <p14:creationId xmlns="" xmlns:p14="http://schemas.microsoft.com/office/powerpoint/2010/main" val="3246593157"/>
+        <p14:creationId xmlns:p14="http://schemas.microsoft.com/office/powerpoint/2010/main" xmlns="" val="3246593157"/>
       </p:ext>
     </p:extLst>
   </p:cSld>
@@ -827,7 +827,7 @@
             <a:fld id="{78C97017-6FC3-485B-9764-EAC9E56C1D49}" type="datetimeFigureOut">
               <a:rPr lang="en-US" smtClean="0"/>
               <a:pPr/>
-              <a:t>4/10/2019</a:t>
+              <a:t>4/12/2019</a:t>
             </a:fld>
             <a:endParaRPr lang="en-US"/>
           </a:p>
@@ -879,7 +879,7 @@
     </p:spTree>
     <p:extLst>
       <p:ext uri="{BB962C8B-B14F-4D97-AF65-F5344CB8AC3E}">
-        <p14:creationId xmlns="" xmlns:p14="http://schemas.microsoft.com/office/powerpoint/2010/main" val="2707025021"/>
+        <p14:creationId xmlns:p14="http://schemas.microsoft.com/office/powerpoint/2010/main" xmlns="" val="2707025021"/>
       </p:ext>
     </p:extLst>
   </p:cSld>
@@ -1007,7 +1007,7 @@
             <a:fld id="{78C97017-6FC3-485B-9764-EAC9E56C1D49}" type="datetimeFigureOut">
               <a:rPr lang="en-US" smtClean="0"/>
               <a:pPr/>
-              <a:t>4/10/2019</a:t>
+              <a:t>4/12/2019</a:t>
             </a:fld>
             <a:endParaRPr lang="en-US"/>
           </a:p>
@@ -1059,7 +1059,7 @@
     </p:spTree>
     <p:extLst>
       <p:ext uri="{BB962C8B-B14F-4D97-AF65-F5344CB8AC3E}">
-        <p14:creationId xmlns="" xmlns:p14="http://schemas.microsoft.com/office/powerpoint/2010/main" val="568378986"/>
+        <p14:creationId xmlns:p14="http://schemas.microsoft.com/office/powerpoint/2010/main" xmlns="" val="568378986"/>
       </p:ext>
     </p:extLst>
   </p:cSld>
@@ -1177,7 +1177,7 @@
             <a:fld id="{78C97017-6FC3-485B-9764-EAC9E56C1D49}" type="datetimeFigureOut">
               <a:rPr lang="en-US" smtClean="0"/>
               <a:pPr/>
-              <a:t>4/10/2019</a:t>
+              <a:t>4/12/2019</a:t>
             </a:fld>
             <a:endParaRPr lang="en-US"/>
           </a:p>
@@ -1229,7 +1229,7 @@
     </p:spTree>
     <p:extLst>
       <p:ext uri="{BB962C8B-B14F-4D97-AF65-F5344CB8AC3E}">
-        <p14:creationId xmlns="" xmlns:p14="http://schemas.microsoft.com/office/powerpoint/2010/main" val="266658052"/>
+        <p14:creationId xmlns:p14="http://schemas.microsoft.com/office/powerpoint/2010/main" xmlns="" val="266658052"/>
       </p:ext>
     </p:extLst>
   </p:cSld>
@@ -1424,7 +1424,7 @@
             <a:fld id="{78C97017-6FC3-485B-9764-EAC9E56C1D49}" type="datetimeFigureOut">
               <a:rPr lang="en-US" smtClean="0"/>
               <a:pPr/>
-              <a:t>4/10/2019</a:t>
+              <a:t>4/12/2019</a:t>
             </a:fld>
             <a:endParaRPr lang="en-US"/>
           </a:p>
@@ -1476,7 +1476,7 @@
     </p:spTree>
     <p:extLst>
       <p:ext uri="{BB962C8B-B14F-4D97-AF65-F5344CB8AC3E}">
-        <p14:creationId xmlns="" xmlns:p14="http://schemas.microsoft.com/office/powerpoint/2010/main" val="474686344"/>
+        <p14:creationId xmlns:p14="http://schemas.microsoft.com/office/powerpoint/2010/main" xmlns="" val="474686344"/>
       </p:ext>
     </p:extLst>
   </p:cSld>
@@ -1711,7 +1711,7 @@
             <a:fld id="{78C97017-6FC3-485B-9764-EAC9E56C1D49}" type="datetimeFigureOut">
               <a:rPr lang="en-US" smtClean="0"/>
               <a:pPr/>
-              <a:t>4/10/2019</a:t>
+              <a:t>4/12/2019</a:t>
             </a:fld>
             <a:endParaRPr lang="en-US"/>
           </a:p>
@@ -1763,7 +1763,7 @@
     </p:spTree>
     <p:extLst>
       <p:ext uri="{BB962C8B-B14F-4D97-AF65-F5344CB8AC3E}">
-        <p14:creationId xmlns="" xmlns:p14="http://schemas.microsoft.com/office/powerpoint/2010/main" val="562293251"/>
+        <p14:creationId xmlns:p14="http://schemas.microsoft.com/office/powerpoint/2010/main" xmlns="" val="562293251"/>
       </p:ext>
     </p:extLst>
   </p:cSld>
@@ -2132,7 +2132,7 @@
             <a:fld id="{78C97017-6FC3-485B-9764-EAC9E56C1D49}" type="datetimeFigureOut">
               <a:rPr lang="en-US" smtClean="0"/>
               <a:pPr/>
-              <a:t>4/10/2019</a:t>
+              <a:t>4/12/2019</a:t>
             </a:fld>
             <a:endParaRPr lang="en-US"/>
           </a:p>
@@ -2184,7 +2184,7 @@
     </p:spTree>
     <p:extLst>
       <p:ext uri="{BB962C8B-B14F-4D97-AF65-F5344CB8AC3E}">
-        <p14:creationId xmlns="" xmlns:p14="http://schemas.microsoft.com/office/powerpoint/2010/main" val="1126424250"/>
+        <p14:creationId xmlns:p14="http://schemas.microsoft.com/office/powerpoint/2010/main" xmlns="" val="1126424250"/>
       </p:ext>
     </p:extLst>
   </p:cSld>
@@ -2251,7 +2251,7 @@
             <a:fld id="{78C97017-6FC3-485B-9764-EAC9E56C1D49}" type="datetimeFigureOut">
               <a:rPr lang="en-US" smtClean="0"/>
               <a:pPr/>
-              <a:t>4/10/2019</a:t>
+              <a:t>4/12/2019</a:t>
             </a:fld>
             <a:endParaRPr lang="en-US"/>
           </a:p>
@@ -2303,7 +2303,7 @@
     </p:spTree>
     <p:extLst>
       <p:ext uri="{BB962C8B-B14F-4D97-AF65-F5344CB8AC3E}">
-        <p14:creationId xmlns="" xmlns:p14="http://schemas.microsoft.com/office/powerpoint/2010/main" val="4159724230"/>
+        <p14:creationId xmlns:p14="http://schemas.microsoft.com/office/powerpoint/2010/main" xmlns="" val="4159724230"/>
       </p:ext>
     </p:extLst>
   </p:cSld>
@@ -2348,7 +2348,7 @@
             <a:fld id="{78C97017-6FC3-485B-9764-EAC9E56C1D49}" type="datetimeFigureOut">
               <a:rPr lang="en-US" smtClean="0"/>
               <a:pPr/>
-              <a:t>4/10/2019</a:t>
+              <a:t>4/12/2019</a:t>
             </a:fld>
             <a:endParaRPr lang="en-US"/>
           </a:p>
@@ -2400,7 +2400,7 @@
     </p:spTree>
     <p:extLst>
       <p:ext uri="{BB962C8B-B14F-4D97-AF65-F5344CB8AC3E}">
-        <p14:creationId xmlns="" xmlns:p14="http://schemas.microsoft.com/office/powerpoint/2010/main" val="1793928710"/>
+        <p14:creationId xmlns:p14="http://schemas.microsoft.com/office/powerpoint/2010/main" xmlns="" val="1793928710"/>
       </p:ext>
     </p:extLst>
   </p:cSld>
@@ -2625,7 +2625,7 @@
             <a:fld id="{78C97017-6FC3-485B-9764-EAC9E56C1D49}" type="datetimeFigureOut">
               <a:rPr lang="en-US" smtClean="0"/>
               <a:pPr/>
-              <a:t>4/10/2019</a:t>
+              <a:t>4/12/2019</a:t>
             </a:fld>
             <a:endParaRPr lang="en-US"/>
           </a:p>
@@ -2677,7 +2677,7 @@
     </p:spTree>
     <p:extLst>
       <p:ext uri="{BB962C8B-B14F-4D97-AF65-F5344CB8AC3E}">
-        <p14:creationId xmlns="" xmlns:p14="http://schemas.microsoft.com/office/powerpoint/2010/main" val="2076802089"/>
+        <p14:creationId xmlns:p14="http://schemas.microsoft.com/office/powerpoint/2010/main" xmlns="" val="2076802089"/>
       </p:ext>
     </p:extLst>
   </p:cSld>
@@ -2879,7 +2879,7 @@
             <a:fld id="{78C97017-6FC3-485B-9764-EAC9E56C1D49}" type="datetimeFigureOut">
               <a:rPr lang="en-US" smtClean="0"/>
               <a:pPr/>
-              <a:t>4/10/2019</a:t>
+              <a:t>4/12/2019</a:t>
             </a:fld>
             <a:endParaRPr lang="en-US"/>
           </a:p>
@@ -2931,7 +2931,7 @@
     </p:spTree>
     <p:extLst>
       <p:ext uri="{BB962C8B-B14F-4D97-AF65-F5344CB8AC3E}">
-        <p14:creationId xmlns="" xmlns:p14="http://schemas.microsoft.com/office/powerpoint/2010/main" val="201835938"/>
+        <p14:creationId xmlns:p14="http://schemas.microsoft.com/office/powerpoint/2010/main" xmlns="" val="201835938"/>
       </p:ext>
     </p:extLst>
   </p:cSld>
@@ -3092,7 +3092,7 @@
             <a:fld id="{78C97017-6FC3-485B-9764-EAC9E56C1D49}" type="datetimeFigureOut">
               <a:rPr lang="en-US" smtClean="0"/>
               <a:pPr/>
-              <a:t>4/10/2019</a:t>
+              <a:t>4/12/2019</a:t>
             </a:fld>
             <a:endParaRPr lang="en-US"/>
           </a:p>
@@ -3180,7 +3180,7 @@
     </p:spTree>
     <p:extLst>
       <p:ext uri="{BB962C8B-B14F-4D97-AF65-F5344CB8AC3E}">
-        <p14:creationId xmlns="" xmlns:p14="http://schemas.microsoft.com/office/powerpoint/2010/main" val="2341400630"/>
+        <p14:creationId xmlns:p14="http://schemas.microsoft.com/office/powerpoint/2010/main" xmlns="" val="2341400630"/>
       </p:ext>
     </p:extLst>
   </p:cSld>
@@ -3473,7 +3473,7 @@
           <p:cNvPr id="2" name="Group 1">
             <a:extLst>
               <a:ext uri="{FF2B5EF4-FFF2-40B4-BE49-F238E27FC236}">
-                <a16:creationId xmlns="" xmlns:a16="http://schemas.microsoft.com/office/drawing/2014/main" id="{CFC9501E-4E0F-4466-BE3B-82FD1271FAF5}"/>
+                <a16:creationId xmlns:a16="http://schemas.microsoft.com/office/drawing/2014/main" xmlns="" id="{CFC9501E-4E0F-4466-BE3B-82FD1271FAF5}"/>
               </a:ext>
             </a:extLst>
           </p:cNvPr>
@@ -3482,10 +3482,10 @@
         </p:nvGrpSpPr>
         <p:grpSpPr>
           <a:xfrm>
-            <a:off x="2209800" y="838200"/>
-            <a:ext cx="5105400" cy="2209800"/>
-            <a:chOff x="2209800" y="838200"/>
-            <a:chExt cx="5105400" cy="2209800"/>
+            <a:off x="3124200" y="838200"/>
+            <a:ext cx="4191000" cy="1828800"/>
+            <a:chOff x="3124200" y="838200"/>
+            <a:chExt cx="4191000" cy="1828800"/>
           </a:xfrm>
         </p:grpSpPr>
         <p:sp>
@@ -3493,7 +3493,7 @@
             <p:cNvPr id="75" name="Rectangle 65">
               <a:extLst>
                 <a:ext uri="{FF2B5EF4-FFF2-40B4-BE49-F238E27FC236}">
-                  <a16:creationId xmlns="" xmlns:a16="http://schemas.microsoft.com/office/drawing/2014/main" id="{86D9C0B2-FA59-4585-B97A-302221C9FED3}"/>
+                  <a16:creationId xmlns:a16="http://schemas.microsoft.com/office/drawing/2014/main" xmlns="" id="{86D9C0B2-FA59-4585-B97A-302221C9FED3}"/>
                 </a:ext>
               </a:extLst>
             </p:cNvPr>
@@ -3502,8 +3502,8 @@
           </p:nvSpPr>
           <p:spPr>
             <a:xfrm>
-              <a:off x="2209800" y="838200"/>
-              <a:ext cx="5105400" cy="2209800"/>
+              <a:off x="3124200" y="838200"/>
+              <a:ext cx="4191000" cy="1828800"/>
             </a:xfrm>
             <a:prstGeom prst="roundRect">
               <a:avLst>
@@ -3549,10 +3549,10 @@
         </p:sp>
         <p:grpSp>
           <p:nvGrpSpPr>
-            <p:cNvPr id="40" name="Group 39">
+            <p:cNvPr id="38" name="Group 37">
               <a:extLst>
                 <a:ext uri="{FF2B5EF4-FFF2-40B4-BE49-F238E27FC236}">
-                  <a16:creationId xmlns="" xmlns:a16="http://schemas.microsoft.com/office/drawing/2014/main" id="{9FAB192C-7407-40F7-8425-4DC4E7B4A2F5}"/>
+                  <a16:creationId xmlns:a16="http://schemas.microsoft.com/office/drawing/2014/main" xmlns="" id="{02598709-3CB8-4D30-BBE3-F77447B817D7}"/>
                 </a:ext>
               </a:extLst>
             </p:cNvPr>
@@ -3561,18 +3561,74 @@
           </p:nvGrpSpPr>
           <p:grpSpPr>
             <a:xfrm>
-              <a:off x="2502120" y="1177240"/>
-              <a:ext cx="3708348" cy="1455520"/>
-              <a:chOff x="2362200" y="1066800"/>
-              <a:chExt cx="3708348" cy="1455520"/>
+              <a:off x="3466932" y="1177240"/>
+              <a:ext cx="1562268" cy="1226920"/>
+              <a:chOff x="3327012" y="1066800"/>
+              <a:chExt cx="1562268" cy="1226920"/>
             </a:xfrm>
           </p:grpSpPr>
           <p:sp>
             <p:nvSpPr>
-              <p:cNvPr id="56" name="Rectangle 8">
+              <p:cNvPr id="46" name="Rectangle 8"/>
+              <p:cNvSpPr/>
+              <p:nvPr/>
+            </p:nvSpPr>
+            <p:spPr>
+              <a:xfrm>
+                <a:off x="3327012" y="1946960"/>
+                <a:ext cx="1562268" cy="346760"/>
+              </a:xfrm>
+              <a:prstGeom prst="rect">
+                <a:avLst/>
+              </a:prstGeom>
+              <a:ln w="19050">
+                <a:solidFill>
+                  <a:srgbClr val="7030A0"/>
+                </a:solidFill>
+              </a:ln>
+              <a:effectLst/>
+            </p:spPr>
+            <p:style>
+              <a:lnRef idx="1">
+                <a:schemeClr val="accent4"/>
+              </a:lnRef>
+              <a:fillRef idx="2">
+                <a:schemeClr val="accent4"/>
+              </a:fillRef>
+              <a:effectRef idx="1">
+                <a:schemeClr val="accent4"/>
+              </a:effectRef>
+              <a:fontRef idx="minor">
+                <a:schemeClr val="dk1"/>
+              </a:fontRef>
+            </p:style>
+            <p:txBody>
+              <a:bodyPr rtlCol="0" anchor="ctr"/>
+              <a:lstStyle/>
+              <a:p>
+                <a:pPr algn="ctr"/>
+                <a:r>
+                  <a:rPr lang="en-SG" sz="1050" b="1" dirty="0" smtClean="0">
+                    <a:solidFill>
+                      <a:srgbClr val="7030A0"/>
+                    </a:solidFill>
+                  </a:rPr>
+                  <a:t>ModuleInfo</a:t>
+                </a:r>
+                <a:endParaRPr lang="en-SG" sz="1050" b="1" dirty="0">
+                  <a:solidFill>
+                    <a:srgbClr val="7030A0"/>
+                  </a:solidFill>
+                </a:endParaRPr>
+              </a:p>
+            </p:txBody>
+          </p:sp>
+          <p:sp>
+            <p:nvSpPr>
+              <p:cNvPr id="43" name="Rectangle 8">
                 <a:extLst>
                   <a:ext uri="{FF2B5EF4-FFF2-40B4-BE49-F238E27FC236}">
-                    <a16:creationId xmlns="" xmlns:a16="http://schemas.microsoft.com/office/drawing/2014/main" id="{CAB969BA-DAFC-4D81-A6DC-E2A49EB5BBAB}"/>
+                    <a16:creationId xmlns:a16="http://schemas.microsoft.com/office/drawing/2014/main" xmlns="" id="{512CB70F-C230-4DEB-ABC6-A3BCDB90D67C}"/>
                   </a:ext>
                 </a:extLst>
               </p:cNvPr>
@@ -3581,8 +3637,8 @@
             </p:nvSpPr>
             <p:spPr>
               <a:xfrm>
-                <a:off x="4508280" y="2175560"/>
-                <a:ext cx="1562268" cy="346760"/>
+                <a:off x="3441480" y="1066800"/>
+                <a:ext cx="1447688" cy="346760"/>
               </a:xfrm>
               <a:prstGeom prst="rect">
                 <a:avLst/>
@@ -3619,7 +3675,7 @@
                       <a:srgbClr val="7030A0"/>
                     </a:solidFill>
                   </a:rPr>
-                  <a:t>ModuleInfoTitle</a:t>
+                  <a:t>RecModule</a:t>
                 </a:r>
                 <a:endParaRPr lang="en-SG" sz="1050" b="1" dirty="0">
                   <a:solidFill>
@@ -3629,145 +3685,6 @@
               </a:p>
             </p:txBody>
           </p:sp>
-          <p:grpSp>
-            <p:nvGrpSpPr>
-              <p:cNvPr id="38" name="Group 37">
-                <a:extLst>
-                  <a:ext uri="{FF2B5EF4-FFF2-40B4-BE49-F238E27FC236}">
-                    <a16:creationId xmlns="" xmlns:a16="http://schemas.microsoft.com/office/drawing/2014/main" id="{02598709-3CB8-4D30-BBE3-F77447B817D7}"/>
-                  </a:ext>
-                </a:extLst>
-              </p:cNvPr>
-              <p:cNvGrpSpPr/>
-              <p:nvPr/>
-            </p:nvGrpSpPr>
-            <p:grpSpPr>
-              <a:xfrm>
-                <a:off x="2362200" y="1066800"/>
-                <a:ext cx="2526968" cy="1455520"/>
-                <a:chOff x="2362200" y="1066800"/>
-                <a:chExt cx="2526968" cy="1455520"/>
-              </a:xfrm>
-            </p:grpSpPr>
-            <p:sp>
-              <p:nvSpPr>
-                <p:cNvPr id="46" name="Rectangle 8"/>
-                <p:cNvSpPr/>
-                <p:nvPr/>
-              </p:nvSpPr>
-              <p:spPr>
-                <a:xfrm>
-                  <a:off x="2362200" y="2175560"/>
-                  <a:ext cx="1562268" cy="346760"/>
-                </a:xfrm>
-                <a:prstGeom prst="rect">
-                  <a:avLst/>
-                </a:prstGeom>
-                <a:ln w="19050">
-                  <a:solidFill>
-                    <a:srgbClr val="7030A0"/>
-                  </a:solidFill>
-                </a:ln>
-                <a:effectLst/>
-              </p:spPr>
-              <p:style>
-                <a:lnRef idx="1">
-                  <a:schemeClr val="accent4"/>
-                </a:lnRef>
-                <a:fillRef idx="2">
-                  <a:schemeClr val="accent4"/>
-                </a:fillRef>
-                <a:effectRef idx="1">
-                  <a:schemeClr val="accent4"/>
-                </a:effectRef>
-                <a:fontRef idx="minor">
-                  <a:schemeClr val="dk1"/>
-                </a:fontRef>
-              </p:style>
-              <p:txBody>
-                <a:bodyPr rtlCol="0" anchor="ctr"/>
-                <a:lstStyle/>
-                <a:p>
-                  <a:pPr algn="ctr"/>
-                  <a:r>
-                    <a:rPr lang="en-SG" sz="1050" b="1" dirty="0" smtClean="0">
-                      <a:solidFill>
-                        <a:srgbClr val="7030A0"/>
-                      </a:solidFill>
-                    </a:rPr>
-                    <a:t>ModuleInfoCode</a:t>
-                  </a:r>
-                  <a:endParaRPr lang="en-SG" sz="1050" b="1" dirty="0">
-                    <a:solidFill>
-                      <a:srgbClr val="7030A0"/>
-                    </a:solidFill>
-                  </a:endParaRPr>
-                </a:p>
-              </p:txBody>
-            </p:sp>
-            <p:sp>
-              <p:nvSpPr>
-                <p:cNvPr id="43" name="Rectangle 8">
-                  <a:extLst>
-                    <a:ext uri="{FF2B5EF4-FFF2-40B4-BE49-F238E27FC236}">
-                      <a16:creationId xmlns="" xmlns:a16="http://schemas.microsoft.com/office/drawing/2014/main" id="{512CB70F-C230-4DEB-ABC6-A3BCDB90D67C}"/>
-                    </a:ext>
-                  </a:extLst>
-                </p:cNvPr>
-                <p:cNvSpPr/>
-                <p:nvPr/>
-              </p:nvSpPr>
-              <p:spPr>
-                <a:xfrm>
-                  <a:off x="3441480" y="1066800"/>
-                  <a:ext cx="1447688" cy="346760"/>
-                </a:xfrm>
-                <a:prstGeom prst="rect">
-                  <a:avLst/>
-                </a:prstGeom>
-                <a:ln w="19050">
-                  <a:solidFill>
-                    <a:srgbClr val="7030A0"/>
-                  </a:solidFill>
-                </a:ln>
-                <a:effectLst/>
-              </p:spPr>
-              <p:style>
-                <a:lnRef idx="1">
-                  <a:schemeClr val="accent4"/>
-                </a:lnRef>
-                <a:fillRef idx="2">
-                  <a:schemeClr val="accent4"/>
-                </a:fillRef>
-                <a:effectRef idx="1">
-                  <a:schemeClr val="accent4"/>
-                </a:effectRef>
-                <a:fontRef idx="minor">
-                  <a:schemeClr val="dk1"/>
-                </a:fontRef>
-              </p:style>
-              <p:txBody>
-                <a:bodyPr rtlCol="0" anchor="ctr"/>
-                <a:lstStyle/>
-                <a:p>
-                  <a:pPr algn="ctr"/>
-                  <a:r>
-                    <a:rPr lang="en-US" sz="1050" b="1" dirty="0" smtClean="0">
-                      <a:solidFill>
-                        <a:srgbClr val="7030A0"/>
-                      </a:solidFill>
-                    </a:rPr>
-                    <a:t>RecModule</a:t>
-                  </a:r>
-                  <a:endParaRPr lang="en-SG" sz="1050" b="1" dirty="0">
-                    <a:solidFill>
-                      <a:srgbClr val="7030A0"/>
-                    </a:solidFill>
-                  </a:endParaRPr>
-                </a:p>
-              </p:txBody>
-            </p:sp>
-          </p:grpSp>
         </p:grpSp>
       </p:grpSp>
       <p:sp>
@@ -3775,7 +3692,7 @@
           <p:cNvPr id="19" name="Flowchart: Decision 96">
             <a:extLst>
               <a:ext uri="{FF2B5EF4-FFF2-40B4-BE49-F238E27FC236}">
-                <a16:creationId xmlns="" xmlns:a16="http://schemas.microsoft.com/office/drawing/2014/main" id="{2C025E8A-FCB2-4EB0-B1C2-9B82B90D816C}"/>
+                <a16:creationId xmlns:a16="http://schemas.microsoft.com/office/drawing/2014/main" xmlns="" id="{2C025E8A-FCB2-4EB0-B1C2-9B82B90D816C}"/>
               </a:ext>
             </a:extLst>
           </p:cNvPr>
@@ -3829,46 +3746,7 @@
         </p:nvSpPr>
         <p:spPr>
           <a:xfrm>
-            <a:off x="3048000" y="2057400"/>
-            <a:ext cx="173736" cy="137542"/>
-          </a:xfrm>
-          <a:prstGeom prst="rect">
-            <a:avLst/>
-          </a:prstGeom>
-          <a:noFill/>
-        </p:spPr>
-        <p:txBody>
-          <a:bodyPr wrap="square" lIns="0" tIns="0" rIns="0" bIns="0" rtlCol="0">
-            <a:noAutofit/>
-          </a:bodyPr>
-          <a:lstStyle/>
-          <a:p>
-            <a:pPr algn="ctr"/>
-            <a:r>
-              <a:rPr lang="en-US" sz="1100" dirty="0">
-                <a:solidFill>
-                  <a:srgbClr val="7030A0"/>
-                </a:solidFill>
-              </a:rPr>
-              <a:t>1</a:t>
-            </a:r>
-            <a:endParaRPr lang="en-SG" sz="1100" dirty="0">
-              <a:solidFill>
-                <a:srgbClr val="7030A0"/>
-              </a:solidFill>
-            </a:endParaRPr>
-          </a:p>
-        </p:txBody>
-      </p:sp>
-      <p:sp>
-        <p:nvSpPr>
-          <p:cNvPr id="22" name="TextBox 21"/>
-          <p:cNvSpPr txBox="1"/>
-          <p:nvPr/>
-        </p:nvSpPr>
-        <p:spPr>
-          <a:xfrm>
-            <a:off x="5465064" y="2057400"/>
+            <a:off x="4038600" y="1843658"/>
             <a:ext cx="173736" cy="137542"/>
           </a:xfrm>
           <a:prstGeom prst="rect">
@@ -3993,7 +3871,7 @@
           <p:cNvPr id="25" name="Rectangle 8">
             <a:extLst>
               <a:ext uri="{FF2B5EF4-FFF2-40B4-BE49-F238E27FC236}">
-                <a16:creationId xmlns="" xmlns:a16="http://schemas.microsoft.com/office/drawing/2014/main" id="{512CB70F-C230-4DEB-ABC6-A3BCDB90D67C}"/>
+                <a16:creationId xmlns:a16="http://schemas.microsoft.com/office/drawing/2014/main" xmlns="" id="{512CB70F-C230-4DEB-ABC6-A3BCDB90D67C}"/>
               </a:ext>
             </a:extLst>
           </p:cNvPr>
@@ -4058,7 +3936,7 @@
         </p:nvCxnSpPr>
         <p:spPr>
           <a:xfrm>
-            <a:off x="3276600" y="1970567"/>
+            <a:off x="4260546" y="1752600"/>
             <a:ext cx="6654" cy="304800"/>
           </a:xfrm>
           <a:prstGeom prst="straightConnector1">
@@ -4088,114 +3966,6 @@
           </a:fontRef>
         </p:style>
       </p:cxnSp>
-      <p:cxnSp>
-        <p:nvCxnSpPr>
-          <p:cNvPr id="35" name="Straight Arrow Connector 34"/>
-          <p:cNvCxnSpPr/>
-          <p:nvPr/>
-        </p:nvCxnSpPr>
-        <p:spPr>
-          <a:xfrm>
-            <a:off x="5410200" y="1970567"/>
-            <a:ext cx="6654" cy="304800"/>
-          </a:xfrm>
-          <a:prstGeom prst="straightConnector1">
-            <a:avLst/>
-          </a:prstGeom>
-          <a:ln w="19050">
-            <a:solidFill>
-              <a:srgbClr val="7030A0"/>
-            </a:solidFill>
-            <a:headEnd type="none" w="med" len="med"/>
-            <a:tailEnd type="arrow" w="med" len="med"/>
-          </a:ln>
-          <a:effectLst/>
-        </p:spPr>
-        <p:style>
-          <a:lnRef idx="1">
-            <a:schemeClr val="accent2"/>
-          </a:lnRef>
-          <a:fillRef idx="2">
-            <a:schemeClr val="accent2"/>
-          </a:fillRef>
-          <a:effectRef idx="1">
-            <a:schemeClr val="accent2"/>
-          </a:effectRef>
-          <a:fontRef idx="minor">
-            <a:schemeClr val="dk1"/>
-          </a:fontRef>
-        </p:style>
-      </p:cxnSp>
-      <p:cxnSp>
-        <p:nvCxnSpPr>
-          <p:cNvPr id="39" name="Straight Connector 38"/>
-          <p:cNvCxnSpPr/>
-          <p:nvPr/>
-        </p:nvCxnSpPr>
-        <p:spPr>
-          <a:xfrm>
-            <a:off x="3276600" y="1981200"/>
-            <a:ext cx="2133600" cy="0"/>
-          </a:xfrm>
-          <a:prstGeom prst="line">
-            <a:avLst/>
-          </a:prstGeom>
-          <a:ln w="19050">
-            <a:solidFill>
-              <a:srgbClr val="7030A0"/>
-            </a:solidFill>
-          </a:ln>
-        </p:spPr>
-        <p:style>
-          <a:lnRef idx="1">
-            <a:schemeClr val="accent1"/>
-          </a:lnRef>
-          <a:fillRef idx="0">
-            <a:schemeClr val="accent1"/>
-          </a:fillRef>
-          <a:effectRef idx="0">
-            <a:schemeClr val="accent1"/>
-          </a:effectRef>
-          <a:fontRef idx="minor">
-            <a:schemeClr val="tx1"/>
-          </a:fontRef>
-        </p:style>
-      </p:cxnSp>
-      <p:cxnSp>
-        <p:nvCxnSpPr>
-          <p:cNvPr id="42" name="Straight Connector 41"/>
-          <p:cNvCxnSpPr/>
-          <p:nvPr/>
-        </p:nvCxnSpPr>
-        <p:spPr>
-          <a:xfrm>
-            <a:off x="4277833" y="1752600"/>
-            <a:ext cx="0" cy="228600"/>
-          </a:xfrm>
-          <a:prstGeom prst="line">
-            <a:avLst/>
-          </a:prstGeom>
-          <a:ln w="19050">
-            <a:solidFill>
-              <a:srgbClr val="7030A0"/>
-            </a:solidFill>
-          </a:ln>
-        </p:spPr>
-        <p:style>
-          <a:lnRef idx="1">
-            <a:schemeClr val="accent1"/>
-          </a:lnRef>
-          <a:fillRef idx="0">
-            <a:schemeClr val="accent1"/>
-          </a:fillRef>
-          <a:effectRef idx="0">
-            <a:schemeClr val="accent1"/>
-          </a:effectRef>
-          <a:fontRef idx="minor">
-            <a:schemeClr val="tx1"/>
-          </a:fontRef>
-        </p:style>
-      </p:cxnSp>
       <p:sp>
         <p:nvSpPr>
           <p:cNvPr id="49" name="TextBox 48"/>
@@ -4238,7 +4008,7 @@
     </p:spTree>
     <p:extLst>
       <p:ext uri="{BB962C8B-B14F-4D97-AF65-F5344CB8AC3E}">
-        <p14:creationId xmlns="" xmlns:p14="http://schemas.microsoft.com/office/powerpoint/2010/main" val="2396968029"/>
+        <p14:creationId xmlns:p14="http://schemas.microsoft.com/office/powerpoint/2010/main" xmlns="" val="2396968029"/>
       </p:ext>
     </p:extLst>
   </p:cSld>

</xml_diff>